<commit_message>
(Mod) IC Presentation changes
</commit_message>
<xml_diff>
--- a/SourceCode/GreenField/GreenField.Web/Templates/Abbrev IC Report template.pptx
+++ b/SourceCode/GreenField/GreenField.Web/Templates/Abbrev IC Report template.pptx
@@ -318,7 +318,7 @@
             <a:fld id="{7BA49677-E515-4D80-9969-42B0962A10A0}" type="datetime1">
               <a:rPr lang="en-US"/>
               <a:pPr/>
-              <a:t>11/14/2014</a:t>
+              <a:t>11/21/2014</a:t>
             </a:fld>
             <a:endParaRPr lang="en-US"/>
           </a:p>
@@ -1362,7 +1362,7 @@
           <a:p>
             <a:fld id="{221F4587-3C4B-45A7-B26F-E61215212BD7}" type="datetime1">
               <a:rPr lang="en-US" smtClean="0"/>
-              <a:t>11/14/2014</a:t>
+              <a:t>11/21/2014</a:t>
             </a:fld>
             <a:endParaRPr lang="en-GB" dirty="0"/>
           </a:p>
@@ -1719,7 +1719,7 @@
           <a:p>
             <a:fld id="{5D4DDECE-779E-4403-BDF1-EC482D17F582}" type="datetime1">
               <a:rPr lang="en-US" smtClean="0"/>
-              <a:t>11/14/2014</a:t>
+              <a:t>11/21/2014</a:t>
             </a:fld>
             <a:endParaRPr lang="en-GB" dirty="0"/>
           </a:p>
@@ -2037,7 +2037,7 @@
           <a:p>
             <a:fld id="{DB5E7B97-3E05-4B55-BA90-6DF6A5CD8979}" type="datetime1">
               <a:rPr lang="en-US" smtClean="0"/>
-              <a:t>11/14/2014</a:t>
+              <a:t>11/21/2014</a:t>
             </a:fld>
             <a:endParaRPr lang="en-GB" dirty="0"/>
           </a:p>
@@ -2435,7 +2435,7 @@
           <a:p>
             <a:fld id="{4A55851F-C0CB-47F9-B3EA-A1782DCC4E66}" type="datetime1">
               <a:rPr lang="en-US" smtClean="0"/>
-              <a:t>11/14/2014</a:t>
+              <a:t>11/21/2014</a:t>
             </a:fld>
             <a:endParaRPr lang="en-GB" dirty="0"/>
           </a:p>
@@ -2833,7 +2833,7 @@
           <a:p>
             <a:fld id="{1462931B-2C99-41CD-8E87-9F5B01EB283C}" type="datetime1">
               <a:rPr lang="en-US" smtClean="0"/>
-              <a:t>11/14/2014</a:t>
+              <a:t>11/21/2014</a:t>
             </a:fld>
             <a:endParaRPr lang="en-GB" dirty="0"/>
           </a:p>
@@ -3157,7 +3157,7 @@
           <a:p>
             <a:fld id="{4FFB188F-A3DF-45DE-9366-DAFD81A4F846}" type="datetime1">
               <a:rPr lang="en-US" smtClean="0"/>
-              <a:t>11/14/2014</a:t>
+              <a:t>11/21/2014</a:t>
             </a:fld>
             <a:endParaRPr lang="en-GB" dirty="0"/>
           </a:p>
@@ -3481,7 +3481,7 @@
           <a:p>
             <a:fld id="{8CD432C1-BA4F-4DF9-B060-04EEA74AEB63}" type="datetime1">
               <a:rPr lang="en-US" smtClean="0"/>
-              <a:t>11/14/2014</a:t>
+              <a:t>11/21/2014</a:t>
             </a:fld>
             <a:endParaRPr lang="en-GB" dirty="0"/>
           </a:p>
@@ -3772,7 +3772,7 @@
           <a:p>
             <a:fld id="{9F3C91F2-FBB3-4742-8B5C-7E55D30FC346}" type="datetime1">
               <a:rPr lang="en-US" smtClean="0"/>
-              <a:t>11/14/2014</a:t>
+              <a:t>11/21/2014</a:t>
             </a:fld>
             <a:endParaRPr lang="en-GB" dirty="0"/>
           </a:p>
@@ -3989,7 +3989,7 @@
           <a:p>
             <a:fld id="{2E14C53F-BF27-4CA7-8275-1A34A7D51537}" type="datetime1">
               <a:rPr lang="en-US" smtClean="0"/>
-              <a:t>11/14/2014</a:t>
+              <a:t>11/21/2014</a:t>
             </a:fld>
             <a:endParaRPr lang="en-GB" dirty="0"/>
           </a:p>
@@ -4206,7 +4206,7 @@
           <a:p>
             <a:fld id="{9B619E48-0410-4C02-AFAC-073FDB2FBD47}" type="datetime1">
               <a:rPr lang="en-US" smtClean="0"/>
-              <a:t>11/14/2014</a:t>
+              <a:t>11/21/2014</a:t>
             </a:fld>
             <a:endParaRPr lang="en-GB" dirty="0"/>
           </a:p>
@@ -4377,7 +4377,7 @@
           <a:p>
             <a:fld id="{2B98A838-AA72-4594-ACAF-57868F9946A0}" type="datetime1">
               <a:rPr lang="en-US" smtClean="0"/>
-              <a:t>11/14/2014</a:t>
+              <a:t>11/21/2014</a:t>
             </a:fld>
             <a:endParaRPr lang="en-GB" dirty="0"/>
           </a:p>
@@ -4865,7 +4865,7 @@
           <a:p>
             <a:fld id="{D5235630-917D-47C5-A7FD-05EDE5C2EC97}" type="datetime1">
               <a:rPr lang="en-US" smtClean="0"/>
-              <a:t>11/14/2014</a:t>
+              <a:t>11/21/2014</a:t>
             </a:fld>
             <a:endParaRPr lang="en-GB" dirty="0"/>
           </a:p>
@@ -5014,7 +5014,7 @@
           <a:p>
             <a:fld id="{CF31C152-3035-461B-9FE9-A713524E711D}" type="datetime1">
               <a:rPr lang="en-US" smtClean="0"/>
-              <a:t>11/14/2014</a:t>
+              <a:t>11/21/2014</a:t>
             </a:fld>
             <a:endParaRPr lang="en-GB" dirty="0"/>
           </a:p>
@@ -5443,7 +5443,7 @@
           <a:p>
             <a:fld id="{044B89F7-7123-4CDC-B897-5FFC4B928E38}" type="datetime1">
               <a:rPr lang="en-US" smtClean="0"/>
-              <a:t>11/14/2014</a:t>
+              <a:t>11/21/2014</a:t>
             </a:fld>
             <a:endParaRPr lang="en-GB" dirty="0"/>
           </a:p>
@@ -5742,7 +5742,7 @@
           <a:p>
             <a:fld id="{FEE53783-98F3-4518-B0F1-483EEA357D14}" type="datetime1">
               <a:rPr lang="en-US" smtClean="0"/>
-              <a:t>11/14/2014</a:t>
+              <a:t>11/21/2014</a:t>
             </a:fld>
             <a:endParaRPr lang="en-GB" dirty="0"/>
           </a:p>
@@ -6074,7 +6074,7 @@
           <a:p>
             <a:fld id="{8E44F8FC-BFC5-45B3-BDBC-AB429CDAD8AB}" type="datetime1">
               <a:rPr lang="en-US" smtClean="0"/>
-              <a:t>11/14/2014</a:t>
+              <a:t>11/21/2014</a:t>
             </a:fld>
             <a:endParaRPr lang="en-GB" dirty="0"/>
           </a:p>
@@ -6513,7 +6513,7 @@
           <a:p>
             <a:fld id="{19F2D611-B658-40CB-A3C9-5636775BE6D3}" type="datetime1">
               <a:rPr lang="en-US" smtClean="0"/>
-              <a:t>11/14/2014</a:t>
+              <a:t>11/21/2014</a:t>
             </a:fld>
             <a:endParaRPr lang="en-GB" dirty="0"/>
           </a:p>
@@ -7071,7 +7071,7 @@
           <a:p>
             <a:fld id="{6F46AB46-B9E5-459F-8C87-534B33EF7994}" type="datetime1">
               <a:rPr lang="en-US" smtClean="0"/>
-              <a:t>11/14/2014</a:t>
+              <a:t>11/21/2014</a:t>
             </a:fld>
             <a:endParaRPr lang="en-GB" dirty="0"/>
           </a:p>
@@ -7275,7 +7275,7 @@
           <a:p>
             <a:fld id="{239014C9-6137-49EE-BD92-93CD75EA122E}" type="datetime1">
               <a:rPr lang="en-US" smtClean="0"/>
-              <a:t>11/14/2014</a:t>
+              <a:t>11/21/2014</a:t>
             </a:fld>
             <a:endParaRPr lang="en-GB" dirty="0"/>
           </a:p>
@@ -7479,7 +7479,7 @@
           <a:p>
             <a:fld id="{8F93730E-7C97-4F11-A885-A8A3179CDF9D}" type="datetime1">
               <a:rPr lang="en-US" smtClean="0"/>
-              <a:t>11/14/2014</a:t>
+              <a:t>11/21/2014</a:t>
             </a:fld>
             <a:endParaRPr lang="en-GB" dirty="0"/>
           </a:p>
@@ -7683,7 +7683,7 @@
           <a:p>
             <a:fld id="{A0CFCDFA-6933-4EAC-BEFF-5BC170CA4404}" type="datetime1">
               <a:rPr lang="en-US" smtClean="0"/>
-              <a:t>11/14/2014</a:t>
+              <a:t>11/21/2014</a:t>
             </a:fld>
             <a:endParaRPr lang="en-GB" dirty="0"/>
           </a:p>
@@ -7930,7 +7930,7 @@
           <a:p>
             <a:fld id="{CB6B008C-3601-43E4-B8C3-F11D36064B19}" type="datetime1">
               <a:rPr lang="en-US" smtClean="0"/>
-              <a:t>11/14/2014</a:t>
+              <a:t>11/21/2014</a:t>
             </a:fld>
             <a:endParaRPr lang="en-GB" dirty="0"/>
           </a:p>
@@ -8116,7 +8116,7 @@
           <a:p>
             <a:fld id="{A2A6D869-B416-4AD0-8C4F-183B93BDC3F2}" type="datetime1">
               <a:rPr lang="en-US" smtClean="0"/>
-              <a:t>11/14/2014</a:t>
+              <a:t>11/21/2014</a:t>
             </a:fld>
             <a:endParaRPr lang="en-GB" dirty="0"/>
           </a:p>
@@ -8285,7 +8285,7 @@
           <a:p>
             <a:fld id="{0EDA1953-F1C9-4687-9D65-25471E433FB8}" type="datetime1">
               <a:rPr lang="en-US" smtClean="0"/>
-              <a:t>11/14/2014</a:t>
+              <a:t>11/21/2014</a:t>
             </a:fld>
             <a:endParaRPr lang="en-GB" dirty="0"/>
           </a:p>
@@ -10257,7 +10257,7 @@
           <a:p>
             <a:fld id="{E1C1B178-CC15-49BC-9DD7-D11C28670564}" type="datetime1">
               <a:rPr lang="en-US" sz="800" smtClean="0"/>
-              <a:t>11/14/2014</a:t>
+              <a:t>11/21/2014</a:t>
             </a:fld>
             <a:endParaRPr lang="en-GB" sz="800" dirty="0"/>
           </a:p>
@@ -10272,7 +10272,7 @@
           <p:nvPr>
             <p:extLst>
               <p:ext uri="{D42A27DB-BD31-4B8C-83A1-F6EECF244321}">
-                <p14:modId xmlns:p14="http://schemas.microsoft.com/office/powerpoint/2010/main" val="2622703951"/>
+                <p14:modId xmlns:p14="http://schemas.microsoft.com/office/powerpoint/2010/main" val="713584330"/>
               </p:ext>
             </p:extLst>
           </p:nvPr>
@@ -10288,8 +10288,8 @@
                 <a:tableStyleId>{5C22544A-7EE6-4342-B048-85BDC9FD1C3A}</a:tableStyleId>
               </a:tblPr>
               <a:tblGrid>
-                <a:gridCol w="1508759"/>
-                <a:gridCol w="1391921"/>
+                <a:gridCol w="1711960"/>
+                <a:gridCol w="1188720"/>
                 <a:gridCol w="1889760"/>
                 <a:gridCol w="1244600"/>
               </a:tblGrid>
@@ -12331,17 +12331,33 @@
                     <a:bodyPr/>
                     <a:lstStyle/>
                     <a:p>
-                      <a:pPr algn="l"/>
+                      <a:pPr marL="0" marR="0" indent="0" algn="l" defTabSz="914400" rtl="0" eaLnBrk="1" fontAlgn="auto" latinLnBrk="0" hangingPunct="1">
+                        <a:lnSpc>
+                          <a:spcPct val="100000"/>
+                        </a:lnSpc>
+                        <a:spcBef>
+                          <a:spcPts val="0"/>
+                        </a:spcBef>
+                        <a:spcAft>
+                          <a:spcPts val="0"/>
+                        </a:spcAft>
+                        <a:buClrTx/>
+                        <a:buSzTx/>
+                        <a:buFontTx/>
+                        <a:buNone/>
+                        <a:tabLst/>
+                        <a:defRPr/>
+                      </a:pPr>
                       <a:r>
-                        <a:rPr lang="en-US" sz="1100" b="1" dirty="0" smtClean="0">
+                        <a:rPr lang="en-US" sz="1100" b="1" smtClean="0">
                           <a:solidFill>
                             <a:srgbClr val="00295B"/>
                           </a:solidFill>
                         </a:rPr>
-                        <a:t>Buy-Sell valuations:</a:t>
+                        <a:t>Recommended Range :</a:t>
                       </a:r>
                       <a:r>
-                        <a:rPr lang="en-US" sz="1100" b="1" baseline="0" dirty="0" smtClean="0">
+                        <a:rPr lang="en-US" sz="1100" b="1" baseline="0" smtClean="0">
                           <a:solidFill>
                             <a:srgbClr val="00295B"/>
                           </a:solidFill>
@@ -12973,7 +12989,7 @@
           <a:p>
             <a:fld id="{E1C1B178-CC15-49BC-9DD7-D11C28670564}" type="datetime1">
               <a:rPr lang="en-US" sz="800" smtClean="0"/>
-              <a:t>11/14/2014</a:t>
+              <a:t>11/21/2014</a:t>
             </a:fld>
             <a:endParaRPr lang="en-GB" sz="800" dirty="0"/>
           </a:p>

</xml_diff>